<commit_message>
Final powerpoint slides for Intro to go video
</commit_message>
<xml_diff>
--- a/Intro_to_go/Introduction to Go.pptx
+++ b/Intro_to_go/Introduction to Go.pptx
@@ -6,6 +6,8 @@
   </p:sldMasterIdLst>
   <p:sldIdLst>
     <p:sldId id="256" r:id="rId2"/>
+    <p:sldId id="257" r:id="rId3"/>
+    <p:sldId id="258" r:id="rId4"/>
   </p:sldIdLst>
   <p:sldSz cx="12192000" cy="6858000"/>
   <p:notesSz cx="6858000" cy="9144000"/>
@@ -3456,6 +3458,330 @@
 </p:sld>
 </file>
 
+<file path=ppt/slides/slide2.xml><?xml version="1.0" encoding="utf-8"?>
+<p:sld xmlns:a="http://schemas.openxmlformats.org/drawingml/2006/main" xmlns:r="http://schemas.openxmlformats.org/officeDocument/2006/relationships" xmlns:p="http://schemas.openxmlformats.org/presentationml/2006/main">
+  <p:cSld>
+    <p:bg>
+      <p:bgPr>
+        <a:blipFill dpi="0" rotWithShape="1">
+          <a:blip r:embed="rId2">
+            <a:lum/>
+          </a:blip>
+          <a:srcRect/>
+          <a:stretch>
+            <a:fillRect t="-1000" b="-1000"/>
+          </a:stretch>
+        </a:blipFill>
+        <a:effectLst/>
+      </p:bgPr>
+    </p:bg>
+    <p:spTree>
+      <p:nvGrpSpPr>
+        <p:cNvPr id="1" name=""/>
+        <p:cNvGrpSpPr/>
+        <p:nvPr/>
+      </p:nvGrpSpPr>
+      <p:grpSpPr>
+        <a:xfrm>
+          <a:off x="0" y="0"/>
+          <a:ext cx="0" cy="0"/>
+          <a:chOff x="0" y="0"/>
+          <a:chExt cx="0" cy="0"/>
+        </a:xfrm>
+      </p:grpSpPr>
+      <p:sp>
+        <p:nvSpPr>
+          <p:cNvPr id="4" name="TextBox 3">
+            <a:extLst>
+              <a:ext uri="{FF2B5EF4-FFF2-40B4-BE49-F238E27FC236}">
+                <a16:creationId xmlns:a16="http://schemas.microsoft.com/office/drawing/2014/main" id="{4A907AE9-A690-42BE-87ED-8E4AEBBE54C6}"/>
+              </a:ext>
+            </a:extLst>
+          </p:cNvPr>
+          <p:cNvSpPr txBox="1"/>
+          <p:nvPr/>
+        </p:nvSpPr>
+        <p:spPr>
+          <a:xfrm>
+            <a:off x="206907" y="133489"/>
+            <a:ext cx="9537793" cy="2308324"/>
+          </a:xfrm>
+          <a:prstGeom prst="rect">
+            <a:avLst/>
+          </a:prstGeom>
+          <a:noFill/>
+        </p:spPr>
+        <p:txBody>
+          <a:bodyPr wrap="square" rtlCol="0">
+            <a:spAutoFit/>
+          </a:bodyPr>
+          <a:lstStyle/>
+          <a:p>
+            <a:pPr marL="285750" indent="-285750">
+              <a:buFont typeface="Arial" panose="020B0604020202020204" pitchFamily="34" charset="0"/>
+              <a:buChar char="•"/>
+            </a:pPr>
+            <a:r>
+              <a:rPr lang="en-US" dirty="0"/>
+              <a:t>What kind of programming language is Go ?</a:t>
+            </a:r>
+          </a:p>
+          <a:p>
+            <a:pPr marL="742950" lvl="1" indent="-285750">
+              <a:buFont typeface="Arial" panose="020B0604020202020204" pitchFamily="34" charset="0"/>
+              <a:buChar char="•"/>
+            </a:pPr>
+            <a:r>
+              <a:rPr lang="en-US" dirty="0"/>
+              <a:t>Compiled programming language</a:t>
+            </a:r>
+          </a:p>
+          <a:p>
+            <a:pPr marL="742950" lvl="1" indent="-285750">
+              <a:buFont typeface="Arial" panose="020B0604020202020204" pitchFamily="34" charset="0"/>
+              <a:buChar char="•"/>
+            </a:pPr>
+            <a:r>
+              <a:rPr lang="en-US" dirty="0"/>
+              <a:t>Statically typed (variable types must be defined)</a:t>
+            </a:r>
+          </a:p>
+          <a:p>
+            <a:pPr marL="742950" lvl="1" indent="-285750">
+              <a:buFont typeface="Arial" panose="020B0604020202020204" pitchFamily="34" charset="0"/>
+              <a:buChar char="•"/>
+            </a:pPr>
+            <a:r>
+              <a:rPr lang="en-US" dirty="0"/>
+              <a:t>Garbage-collected</a:t>
+            </a:r>
+          </a:p>
+          <a:p>
+            <a:pPr marL="742950" lvl="1" indent="-285750">
+              <a:buFont typeface="Arial" panose="020B0604020202020204" pitchFamily="34" charset="0"/>
+              <a:buChar char="•"/>
+            </a:pPr>
+            <a:r>
+              <a:rPr lang="en-US" dirty="0"/>
+              <a:t>Concurrent</a:t>
+            </a:r>
+          </a:p>
+          <a:p>
+            <a:pPr marL="742950" lvl="1" indent="-285750">
+              <a:buFont typeface="Arial" panose="020B0604020202020204" pitchFamily="34" charset="0"/>
+              <a:buChar char="•"/>
+            </a:pPr>
+            <a:r>
+              <a:rPr lang="en-US" dirty="0"/>
+              <a:t>Fast</a:t>
+            </a:r>
+          </a:p>
+          <a:p>
+            <a:pPr marL="742950" lvl="1" indent="-285750">
+              <a:buFont typeface="Arial" panose="020B0604020202020204" pitchFamily="34" charset="0"/>
+              <a:buChar char="•"/>
+            </a:pPr>
+            <a:r>
+              <a:rPr lang="en-US" dirty="0"/>
+              <a:t>Open-source</a:t>
+            </a:r>
+          </a:p>
+          <a:p>
+            <a:pPr marL="742950" lvl="1" indent="-285750">
+              <a:buFont typeface="Arial" panose="020B0604020202020204" pitchFamily="34" charset="0"/>
+              <a:buChar char="•"/>
+            </a:pPr>
+            <a:endParaRPr lang="en-US" dirty="0"/>
+          </a:p>
+        </p:txBody>
+      </p:sp>
+      <p:sp>
+        <p:nvSpPr>
+          <p:cNvPr id="5" name="TextBox 4">
+            <a:extLst>
+              <a:ext uri="{FF2B5EF4-FFF2-40B4-BE49-F238E27FC236}">
+                <a16:creationId xmlns:a16="http://schemas.microsoft.com/office/drawing/2014/main" id="{1DE64156-006C-4CC8-A06B-FE58F3EF2F0B}"/>
+              </a:ext>
+            </a:extLst>
+          </p:cNvPr>
+          <p:cNvSpPr txBox="1"/>
+          <p:nvPr/>
+        </p:nvSpPr>
+        <p:spPr>
+          <a:xfrm>
+            <a:off x="80093" y="3090272"/>
+            <a:ext cx="6015907" cy="1477328"/>
+          </a:xfrm>
+          <a:prstGeom prst="rect">
+            <a:avLst/>
+          </a:prstGeom>
+          <a:noFill/>
+        </p:spPr>
+        <p:txBody>
+          <a:bodyPr wrap="square" rtlCol="0">
+            <a:spAutoFit/>
+          </a:bodyPr>
+          <a:lstStyle/>
+          <a:p>
+            <a:pPr marL="285750" indent="-285750">
+              <a:buFont typeface="Arial" panose="020B0604020202020204" pitchFamily="34" charset="0"/>
+              <a:buChar char="•"/>
+            </a:pPr>
+            <a:r>
+              <a:rPr lang="en-US" dirty="0"/>
+              <a:t>What is Go used for ?</a:t>
+            </a:r>
+          </a:p>
+          <a:p>
+            <a:pPr marL="742950" lvl="1" indent="-285750">
+              <a:buFont typeface="Arial" panose="020B0604020202020204" pitchFamily="34" charset="0"/>
+              <a:buChar char="•"/>
+            </a:pPr>
+            <a:r>
+              <a:rPr lang="en-US" dirty="0"/>
+              <a:t>Web development</a:t>
+            </a:r>
+          </a:p>
+          <a:p>
+            <a:pPr marL="742950" lvl="1" indent="-285750">
+              <a:buFont typeface="Arial" panose="020B0604020202020204" pitchFamily="34" charset="0"/>
+              <a:buChar char="•"/>
+            </a:pPr>
+            <a:r>
+              <a:rPr lang="en-US" dirty="0"/>
+              <a:t>Microservices</a:t>
+            </a:r>
+          </a:p>
+          <a:p>
+            <a:pPr marL="742950" lvl="1" indent="-285750">
+              <a:buFont typeface="Arial" panose="020B0604020202020204" pitchFamily="34" charset="0"/>
+              <a:buChar char="•"/>
+            </a:pPr>
+            <a:r>
+              <a:rPr lang="en-US" dirty="0"/>
+              <a:t>Application development</a:t>
+            </a:r>
+          </a:p>
+          <a:p>
+            <a:pPr marL="742950" lvl="1" indent="-285750">
+              <a:buFont typeface="Arial" panose="020B0604020202020204" pitchFamily="34" charset="0"/>
+              <a:buChar char="•"/>
+            </a:pPr>
+            <a:r>
+              <a:rPr lang="en-US" dirty="0"/>
+              <a:t>Backend </a:t>
+            </a:r>
+          </a:p>
+        </p:txBody>
+      </p:sp>
+      <p:sp>
+        <p:nvSpPr>
+          <p:cNvPr id="6" name="TextBox 5">
+            <a:extLst>
+              <a:ext uri="{FF2B5EF4-FFF2-40B4-BE49-F238E27FC236}">
+                <a16:creationId xmlns:a16="http://schemas.microsoft.com/office/drawing/2014/main" id="{13511043-D09A-4252-A714-BDEA57CDB2A2}"/>
+              </a:ext>
+            </a:extLst>
+          </p:cNvPr>
+          <p:cNvSpPr txBox="1"/>
+          <p:nvPr/>
+        </p:nvSpPr>
+        <p:spPr>
+          <a:xfrm>
+            <a:off x="80093" y="5216059"/>
+            <a:ext cx="6080427" cy="369332"/>
+          </a:xfrm>
+          <a:prstGeom prst="rect">
+            <a:avLst/>
+          </a:prstGeom>
+          <a:noFill/>
+        </p:spPr>
+        <p:txBody>
+          <a:bodyPr wrap="square" rtlCol="0">
+            <a:spAutoFit/>
+          </a:bodyPr>
+          <a:lstStyle/>
+          <a:p>
+            <a:r>
+              <a:rPr lang="en-US" dirty="0">
+                <a:solidFill>
+                  <a:srgbClr val="FF0000"/>
+                </a:solidFill>
+                <a:hlinkClick r:id="rId3">
+                  <a:extLst>
+                    <a:ext uri="{A12FA001-AC4F-418D-AE19-62706E023703}">
+                      <ahyp:hlinkClr xmlns:ahyp="http://schemas.microsoft.com/office/drawing/2018/hyperlinkcolor" val="tx"/>
+                    </a:ext>
+                  </a:extLst>
+                </a:hlinkClick>
+              </a:rPr>
+              <a:t>Go Documentation </a:t>
+            </a:r>
+            <a:endParaRPr lang="en-US" dirty="0">
+              <a:solidFill>
+                <a:srgbClr val="FF0000"/>
+              </a:solidFill>
+            </a:endParaRPr>
+          </a:p>
+        </p:txBody>
+      </p:sp>
+    </p:spTree>
+    <p:extLst>
+      <p:ext uri="{BB962C8B-B14F-4D97-AF65-F5344CB8AC3E}">
+        <p14:creationId xmlns:p14="http://schemas.microsoft.com/office/powerpoint/2010/main" val="2960265564"/>
+      </p:ext>
+    </p:extLst>
+  </p:cSld>
+  <p:clrMapOvr>
+    <a:masterClrMapping/>
+  </p:clrMapOvr>
+</p:sld>
+</file>
+
+<file path=ppt/slides/slide3.xml><?xml version="1.0" encoding="utf-8"?>
+<p:sld xmlns:a="http://schemas.openxmlformats.org/drawingml/2006/main" xmlns:r="http://schemas.openxmlformats.org/officeDocument/2006/relationships" xmlns:p="http://schemas.openxmlformats.org/presentationml/2006/main">
+  <p:cSld>
+    <p:bg>
+      <p:bgPr>
+        <a:blipFill dpi="0" rotWithShape="1">
+          <a:blip r:embed="rId2">
+            <a:lum/>
+          </a:blip>
+          <a:srcRect/>
+          <a:stretch>
+            <a:fillRect t="-6000" b="-6000"/>
+          </a:stretch>
+        </a:blipFill>
+        <a:effectLst/>
+      </p:bgPr>
+    </p:bg>
+    <p:spTree>
+      <p:nvGrpSpPr>
+        <p:cNvPr id="1" name=""/>
+        <p:cNvGrpSpPr/>
+        <p:nvPr/>
+      </p:nvGrpSpPr>
+      <p:grpSpPr>
+        <a:xfrm>
+          <a:off x="0" y="0"/>
+          <a:ext cx="0" cy="0"/>
+          <a:chOff x="0" y="0"/>
+          <a:chExt cx="0" cy="0"/>
+        </a:xfrm>
+      </p:grpSpPr>
+    </p:spTree>
+    <p:extLst>
+      <p:ext uri="{BB962C8B-B14F-4D97-AF65-F5344CB8AC3E}">
+        <p14:creationId xmlns:p14="http://schemas.microsoft.com/office/powerpoint/2010/main" val="1711975994"/>
+      </p:ext>
+    </p:extLst>
+  </p:cSld>
+  <p:clrMapOvr>
+    <a:masterClrMapping/>
+  </p:clrMapOvr>
+</p:sld>
+</file>
+
 <file path=ppt/theme/theme1.xml><?xml version="1.0" encoding="utf-8"?>
 <a:theme xmlns:a="http://schemas.openxmlformats.org/drawingml/2006/main" name="Frame">
   <a:themeElements>

</xml_diff>